<commit_message>
gitAndGithub: Add more info for commenting on PRs
</commit_message>
<xml_diff>
--- a/diagrams/gitAndGithub/managePrs/addComment.pptx
+++ b/diagrams/gitAndGithub/managePrs/addComment.pptx
@@ -6,6 +6,8 @@
   </p:sldMasterIdLst>
   <p:sldIdLst>
     <p:sldId id="258" r:id="rId2"/>
+    <p:sldId id="259" r:id="rId3"/>
+    <p:sldId id="260" r:id="rId4"/>
   </p:sldIdLst>
   <p:sldSz cx="9144000" cy="6858000" type="screen4x3"/>
   <p:notesSz cx="6858000" cy="9144000"/>
@@ -161,7 +163,7 @@
           <a:lstStyle/>
           <a:p>
             <a:r>
-              <a:rPr lang="en-US" smtClean="0"/>
+              <a:rPr lang="en-US"/>
               <a:t>Click to edit Master title style</a:t>
             </a:r>
             <a:endParaRPr lang="en-SG"/>
@@ -280,7 +282,7 @@
           </a:lstStyle>
           <a:p>
             <a:r>
-              <a:rPr lang="en-US" smtClean="0"/>
+              <a:rPr lang="en-US"/>
               <a:t>Click to edit Master subtitle style</a:t>
             </a:r>
             <a:endParaRPr lang="en-SG"/>
@@ -304,7 +306,7 @@
           <a:p>
             <a:fld id="{A1F532DB-2311-4BA7-A4CB-CC15A84E776B}" type="datetimeFigureOut">
               <a:rPr lang="en-SG" smtClean="0"/>
-              <a:t>27/8/2017</a:t>
+              <a:t>27/7/2021</a:t>
             </a:fld>
             <a:endParaRPr lang="en-SG"/>
           </a:p>
@@ -398,7 +400,7 @@
           <a:lstStyle/>
           <a:p>
             <a:r>
-              <a:rPr lang="en-US" smtClean="0"/>
+              <a:rPr lang="en-US"/>
               <a:t>Click to edit Master title style</a:t>
             </a:r>
             <a:endParaRPr lang="en-SG"/>
@@ -422,35 +424,35 @@
           <a:p>
             <a:pPr lvl="0"/>
             <a:r>
-              <a:rPr lang="en-US" smtClean="0"/>
+              <a:rPr lang="en-US"/>
               <a:t>Click to edit Master text styles</a:t>
             </a:r>
           </a:p>
           <a:p>
             <a:pPr lvl="1"/>
             <a:r>
-              <a:rPr lang="en-US" smtClean="0"/>
+              <a:rPr lang="en-US"/>
               <a:t>Second level</a:t>
             </a:r>
           </a:p>
           <a:p>
             <a:pPr lvl="2"/>
             <a:r>
-              <a:rPr lang="en-US" smtClean="0"/>
+              <a:rPr lang="en-US"/>
               <a:t>Third level</a:t>
             </a:r>
           </a:p>
           <a:p>
             <a:pPr lvl="3"/>
             <a:r>
-              <a:rPr lang="en-US" smtClean="0"/>
+              <a:rPr lang="en-US"/>
               <a:t>Fourth level</a:t>
             </a:r>
           </a:p>
           <a:p>
             <a:pPr lvl="4"/>
             <a:r>
-              <a:rPr lang="en-US" smtClean="0"/>
+              <a:rPr lang="en-US"/>
               <a:t>Fifth level</a:t>
             </a:r>
             <a:endParaRPr lang="en-SG"/>
@@ -474,7 +476,7 @@
           <a:p>
             <a:fld id="{A1F532DB-2311-4BA7-A4CB-CC15A84E776B}" type="datetimeFigureOut">
               <a:rPr lang="en-SG" smtClean="0"/>
-              <a:t>27/8/2017</a:t>
+              <a:t>27/7/2021</a:t>
             </a:fld>
             <a:endParaRPr lang="en-SG"/>
           </a:p>
@@ -573,7 +575,7 @@
           <a:lstStyle/>
           <a:p>
             <a:r>
-              <a:rPr lang="en-US" smtClean="0"/>
+              <a:rPr lang="en-US"/>
               <a:t>Click to edit Master title style</a:t>
             </a:r>
             <a:endParaRPr lang="en-SG"/>
@@ -602,35 +604,35 @@
           <a:p>
             <a:pPr lvl="0"/>
             <a:r>
-              <a:rPr lang="en-US" smtClean="0"/>
+              <a:rPr lang="en-US"/>
               <a:t>Click to edit Master text styles</a:t>
             </a:r>
           </a:p>
           <a:p>
             <a:pPr lvl="1"/>
             <a:r>
-              <a:rPr lang="en-US" smtClean="0"/>
+              <a:rPr lang="en-US"/>
               <a:t>Second level</a:t>
             </a:r>
           </a:p>
           <a:p>
             <a:pPr lvl="2"/>
             <a:r>
-              <a:rPr lang="en-US" smtClean="0"/>
+              <a:rPr lang="en-US"/>
               <a:t>Third level</a:t>
             </a:r>
           </a:p>
           <a:p>
             <a:pPr lvl="3"/>
             <a:r>
-              <a:rPr lang="en-US" smtClean="0"/>
+              <a:rPr lang="en-US"/>
               <a:t>Fourth level</a:t>
             </a:r>
           </a:p>
           <a:p>
             <a:pPr lvl="4"/>
             <a:r>
-              <a:rPr lang="en-US" smtClean="0"/>
+              <a:rPr lang="en-US"/>
               <a:t>Fifth level</a:t>
             </a:r>
             <a:endParaRPr lang="en-SG"/>
@@ -654,7 +656,7 @@
           <a:p>
             <a:fld id="{A1F532DB-2311-4BA7-A4CB-CC15A84E776B}" type="datetimeFigureOut">
               <a:rPr lang="en-SG" smtClean="0"/>
-              <a:t>27/8/2017</a:t>
+              <a:t>27/7/2021</a:t>
             </a:fld>
             <a:endParaRPr lang="en-SG"/>
           </a:p>
@@ -748,7 +750,7 @@
           <a:lstStyle/>
           <a:p>
             <a:r>
-              <a:rPr lang="en-US" smtClean="0"/>
+              <a:rPr lang="en-US"/>
               <a:t>Click to edit Master title style</a:t>
             </a:r>
             <a:endParaRPr lang="en-SG"/>
@@ -772,35 +774,35 @@
           <a:p>
             <a:pPr lvl="0"/>
             <a:r>
-              <a:rPr lang="en-US" smtClean="0"/>
+              <a:rPr lang="en-US"/>
               <a:t>Click to edit Master text styles</a:t>
             </a:r>
           </a:p>
           <a:p>
             <a:pPr lvl="1"/>
             <a:r>
-              <a:rPr lang="en-US" smtClean="0"/>
+              <a:rPr lang="en-US"/>
               <a:t>Second level</a:t>
             </a:r>
           </a:p>
           <a:p>
             <a:pPr lvl="2"/>
             <a:r>
-              <a:rPr lang="en-US" smtClean="0"/>
+              <a:rPr lang="en-US"/>
               <a:t>Third level</a:t>
             </a:r>
           </a:p>
           <a:p>
             <a:pPr lvl="3"/>
             <a:r>
-              <a:rPr lang="en-US" smtClean="0"/>
+              <a:rPr lang="en-US"/>
               <a:t>Fourth level</a:t>
             </a:r>
           </a:p>
           <a:p>
             <a:pPr lvl="4"/>
             <a:r>
-              <a:rPr lang="en-US" smtClean="0"/>
+              <a:rPr lang="en-US"/>
               <a:t>Fifth level</a:t>
             </a:r>
             <a:endParaRPr lang="en-SG"/>
@@ -824,7 +826,7 @@
           <a:p>
             <a:fld id="{A1F532DB-2311-4BA7-A4CB-CC15A84E776B}" type="datetimeFigureOut">
               <a:rPr lang="en-SG" smtClean="0"/>
-              <a:t>27/8/2017</a:t>
+              <a:t>27/7/2021</a:t>
             </a:fld>
             <a:endParaRPr lang="en-SG"/>
           </a:p>
@@ -927,7 +929,7 @@
           </a:lstStyle>
           <a:p>
             <a:r>
-              <a:rPr lang="en-US" smtClean="0"/>
+              <a:rPr lang="en-US"/>
               <a:t>Click to edit Master title style</a:t>
             </a:r>
             <a:endParaRPr lang="en-SG"/>
@@ -1047,7 +1049,7 @@
           <a:p>
             <a:pPr lvl="0"/>
             <a:r>
-              <a:rPr lang="en-US" smtClean="0"/>
+              <a:rPr lang="en-US"/>
               <a:t>Click to edit Master text styles</a:t>
             </a:r>
           </a:p>
@@ -1070,7 +1072,7 @@
           <a:p>
             <a:fld id="{A1F532DB-2311-4BA7-A4CB-CC15A84E776B}" type="datetimeFigureOut">
               <a:rPr lang="en-SG" smtClean="0"/>
-              <a:t>27/8/2017</a:t>
+              <a:t>27/7/2021</a:t>
             </a:fld>
             <a:endParaRPr lang="en-SG"/>
           </a:p>
@@ -1164,7 +1166,7 @@
           <a:lstStyle/>
           <a:p>
             <a:r>
-              <a:rPr lang="en-US" smtClean="0"/>
+              <a:rPr lang="en-US"/>
               <a:t>Click to edit Master title style</a:t>
             </a:r>
             <a:endParaRPr lang="en-SG"/>
@@ -1221,35 +1223,35 @@
           <a:p>
             <a:pPr lvl="0"/>
             <a:r>
-              <a:rPr lang="en-US" smtClean="0"/>
+              <a:rPr lang="en-US"/>
               <a:t>Click to edit Master text styles</a:t>
             </a:r>
           </a:p>
           <a:p>
             <a:pPr lvl="1"/>
             <a:r>
-              <a:rPr lang="en-US" smtClean="0"/>
+              <a:rPr lang="en-US"/>
               <a:t>Second level</a:t>
             </a:r>
           </a:p>
           <a:p>
             <a:pPr lvl="2"/>
             <a:r>
-              <a:rPr lang="en-US" smtClean="0"/>
+              <a:rPr lang="en-US"/>
               <a:t>Third level</a:t>
             </a:r>
           </a:p>
           <a:p>
             <a:pPr lvl="3"/>
             <a:r>
-              <a:rPr lang="en-US" smtClean="0"/>
+              <a:rPr lang="en-US"/>
               <a:t>Fourth level</a:t>
             </a:r>
           </a:p>
           <a:p>
             <a:pPr lvl="4"/>
             <a:r>
-              <a:rPr lang="en-US" smtClean="0"/>
+              <a:rPr lang="en-US"/>
               <a:t>Fifth level</a:t>
             </a:r>
             <a:endParaRPr lang="en-SG"/>
@@ -1306,35 +1308,35 @@
           <a:p>
             <a:pPr lvl="0"/>
             <a:r>
-              <a:rPr lang="en-US" smtClean="0"/>
+              <a:rPr lang="en-US"/>
               <a:t>Click to edit Master text styles</a:t>
             </a:r>
           </a:p>
           <a:p>
             <a:pPr lvl="1"/>
             <a:r>
-              <a:rPr lang="en-US" smtClean="0"/>
+              <a:rPr lang="en-US"/>
               <a:t>Second level</a:t>
             </a:r>
           </a:p>
           <a:p>
             <a:pPr lvl="2"/>
             <a:r>
-              <a:rPr lang="en-US" smtClean="0"/>
+              <a:rPr lang="en-US"/>
               <a:t>Third level</a:t>
             </a:r>
           </a:p>
           <a:p>
             <a:pPr lvl="3"/>
             <a:r>
-              <a:rPr lang="en-US" smtClean="0"/>
+              <a:rPr lang="en-US"/>
               <a:t>Fourth level</a:t>
             </a:r>
           </a:p>
           <a:p>
             <a:pPr lvl="4"/>
             <a:r>
-              <a:rPr lang="en-US" smtClean="0"/>
+              <a:rPr lang="en-US"/>
               <a:t>Fifth level</a:t>
             </a:r>
             <a:endParaRPr lang="en-SG"/>
@@ -1358,7 +1360,7 @@
           <a:p>
             <a:fld id="{A1F532DB-2311-4BA7-A4CB-CC15A84E776B}" type="datetimeFigureOut">
               <a:rPr lang="en-SG" smtClean="0"/>
-              <a:t>27/8/2017</a:t>
+              <a:t>27/7/2021</a:t>
             </a:fld>
             <a:endParaRPr lang="en-SG"/>
           </a:p>
@@ -1456,7 +1458,7 @@
           </a:lstStyle>
           <a:p>
             <a:r>
-              <a:rPr lang="en-US" smtClean="0"/>
+              <a:rPr lang="en-US"/>
               <a:t>Click to edit Master title style</a:t>
             </a:r>
             <a:endParaRPr lang="en-SG"/>
@@ -1522,7 +1524,7 @@
           <a:p>
             <a:pPr lvl="0"/>
             <a:r>
-              <a:rPr lang="en-US" smtClean="0"/>
+              <a:rPr lang="en-US"/>
               <a:t>Click to edit Master text styles</a:t>
             </a:r>
           </a:p>
@@ -1578,35 +1580,35 @@
           <a:p>
             <a:pPr lvl="0"/>
             <a:r>
-              <a:rPr lang="en-US" smtClean="0"/>
+              <a:rPr lang="en-US"/>
               <a:t>Click to edit Master text styles</a:t>
             </a:r>
           </a:p>
           <a:p>
             <a:pPr lvl="1"/>
             <a:r>
-              <a:rPr lang="en-US" smtClean="0"/>
+              <a:rPr lang="en-US"/>
               <a:t>Second level</a:t>
             </a:r>
           </a:p>
           <a:p>
             <a:pPr lvl="2"/>
             <a:r>
-              <a:rPr lang="en-US" smtClean="0"/>
+              <a:rPr lang="en-US"/>
               <a:t>Third level</a:t>
             </a:r>
           </a:p>
           <a:p>
             <a:pPr lvl="3"/>
             <a:r>
-              <a:rPr lang="en-US" smtClean="0"/>
+              <a:rPr lang="en-US"/>
               <a:t>Fourth level</a:t>
             </a:r>
           </a:p>
           <a:p>
             <a:pPr lvl="4"/>
             <a:r>
-              <a:rPr lang="en-US" smtClean="0"/>
+              <a:rPr lang="en-US"/>
               <a:t>Fifth level</a:t>
             </a:r>
             <a:endParaRPr lang="en-SG"/>
@@ -1672,7 +1674,7 @@
           <a:p>
             <a:pPr lvl="0"/>
             <a:r>
-              <a:rPr lang="en-US" smtClean="0"/>
+              <a:rPr lang="en-US"/>
               <a:t>Click to edit Master text styles</a:t>
             </a:r>
           </a:p>
@@ -1728,35 +1730,35 @@
           <a:p>
             <a:pPr lvl="0"/>
             <a:r>
-              <a:rPr lang="en-US" smtClean="0"/>
+              <a:rPr lang="en-US"/>
               <a:t>Click to edit Master text styles</a:t>
             </a:r>
           </a:p>
           <a:p>
             <a:pPr lvl="1"/>
             <a:r>
-              <a:rPr lang="en-US" smtClean="0"/>
+              <a:rPr lang="en-US"/>
               <a:t>Second level</a:t>
             </a:r>
           </a:p>
           <a:p>
             <a:pPr lvl="2"/>
             <a:r>
-              <a:rPr lang="en-US" smtClean="0"/>
+              <a:rPr lang="en-US"/>
               <a:t>Third level</a:t>
             </a:r>
           </a:p>
           <a:p>
             <a:pPr lvl="3"/>
             <a:r>
-              <a:rPr lang="en-US" smtClean="0"/>
+              <a:rPr lang="en-US"/>
               <a:t>Fourth level</a:t>
             </a:r>
           </a:p>
           <a:p>
             <a:pPr lvl="4"/>
             <a:r>
-              <a:rPr lang="en-US" smtClean="0"/>
+              <a:rPr lang="en-US"/>
               <a:t>Fifth level</a:t>
             </a:r>
             <a:endParaRPr lang="en-SG"/>
@@ -1780,7 +1782,7 @@
           <a:p>
             <a:fld id="{A1F532DB-2311-4BA7-A4CB-CC15A84E776B}" type="datetimeFigureOut">
               <a:rPr lang="en-SG" smtClean="0"/>
-              <a:t>27/8/2017</a:t>
+              <a:t>27/7/2021</a:t>
             </a:fld>
             <a:endParaRPr lang="en-SG"/>
           </a:p>
@@ -1874,7 +1876,7 @@
           <a:lstStyle/>
           <a:p>
             <a:r>
-              <a:rPr lang="en-US" smtClean="0"/>
+              <a:rPr lang="en-US"/>
               <a:t>Click to edit Master title style</a:t>
             </a:r>
             <a:endParaRPr lang="en-SG"/>
@@ -1898,7 +1900,7 @@
           <a:p>
             <a:fld id="{A1F532DB-2311-4BA7-A4CB-CC15A84E776B}" type="datetimeFigureOut">
               <a:rPr lang="en-SG" smtClean="0"/>
-              <a:t>27/8/2017</a:t>
+              <a:t>27/7/2021</a:t>
             </a:fld>
             <a:endParaRPr lang="en-SG"/>
           </a:p>
@@ -1993,7 +1995,7 @@
           <a:p>
             <a:fld id="{A1F532DB-2311-4BA7-A4CB-CC15A84E776B}" type="datetimeFigureOut">
               <a:rPr lang="en-SG" smtClean="0"/>
-              <a:t>27/8/2017</a:t>
+              <a:t>27/7/2021</a:t>
             </a:fld>
             <a:endParaRPr lang="en-SG"/>
           </a:p>
@@ -2096,7 +2098,7 @@
           </a:lstStyle>
           <a:p>
             <a:r>
-              <a:rPr lang="en-US" smtClean="0"/>
+              <a:rPr lang="en-US"/>
               <a:t>Click to edit Master title style</a:t>
             </a:r>
             <a:endParaRPr lang="en-SG"/>
@@ -2153,35 +2155,35 @@
           <a:p>
             <a:pPr lvl="0"/>
             <a:r>
-              <a:rPr lang="en-US" smtClean="0"/>
+              <a:rPr lang="en-US"/>
               <a:t>Click to edit Master text styles</a:t>
             </a:r>
           </a:p>
           <a:p>
             <a:pPr lvl="1"/>
             <a:r>
-              <a:rPr lang="en-US" smtClean="0"/>
+              <a:rPr lang="en-US"/>
               <a:t>Second level</a:t>
             </a:r>
           </a:p>
           <a:p>
             <a:pPr lvl="2"/>
             <a:r>
-              <a:rPr lang="en-US" smtClean="0"/>
+              <a:rPr lang="en-US"/>
               <a:t>Third level</a:t>
             </a:r>
           </a:p>
           <a:p>
             <a:pPr lvl="3"/>
             <a:r>
-              <a:rPr lang="en-US" smtClean="0"/>
+              <a:rPr lang="en-US"/>
               <a:t>Fourth level</a:t>
             </a:r>
           </a:p>
           <a:p>
             <a:pPr lvl="4"/>
             <a:r>
-              <a:rPr lang="en-US" smtClean="0"/>
+              <a:rPr lang="en-US"/>
               <a:t>Fifth level</a:t>
             </a:r>
             <a:endParaRPr lang="en-SG"/>
@@ -2247,7 +2249,7 @@
           <a:p>
             <a:pPr lvl="0"/>
             <a:r>
-              <a:rPr lang="en-US" smtClean="0"/>
+              <a:rPr lang="en-US"/>
               <a:t>Click to edit Master text styles</a:t>
             </a:r>
           </a:p>
@@ -2270,7 +2272,7 @@
           <a:p>
             <a:fld id="{A1F532DB-2311-4BA7-A4CB-CC15A84E776B}" type="datetimeFigureOut">
               <a:rPr lang="en-SG" smtClean="0"/>
-              <a:t>27/8/2017</a:t>
+              <a:t>27/7/2021</a:t>
             </a:fld>
             <a:endParaRPr lang="en-SG"/>
           </a:p>
@@ -2373,7 +2375,7 @@
           </a:lstStyle>
           <a:p>
             <a:r>
-              <a:rPr lang="en-US" smtClean="0"/>
+              <a:rPr lang="en-US"/>
               <a:t>Click to edit Master title style</a:t>
             </a:r>
             <a:endParaRPr lang="en-SG"/>
@@ -2500,7 +2502,7 @@
           <a:p>
             <a:pPr lvl="0"/>
             <a:r>
-              <a:rPr lang="en-US" smtClean="0"/>
+              <a:rPr lang="en-US"/>
               <a:t>Click to edit Master text styles</a:t>
             </a:r>
           </a:p>
@@ -2523,7 +2525,7 @@
           <a:p>
             <a:fld id="{A1F532DB-2311-4BA7-A4CB-CC15A84E776B}" type="datetimeFigureOut">
               <a:rPr lang="en-SG" smtClean="0"/>
-              <a:t>27/8/2017</a:t>
+              <a:t>27/7/2021</a:t>
             </a:fld>
             <a:endParaRPr lang="en-SG"/>
           </a:p>
@@ -2632,7 +2634,7 @@
           <a:lstStyle/>
           <a:p>
             <a:r>
-              <a:rPr lang="en-US" smtClean="0"/>
+              <a:rPr lang="en-US"/>
               <a:t>Click to edit Master title style</a:t>
             </a:r>
             <a:endParaRPr lang="en-SG"/>
@@ -2666,35 +2668,35 @@
           <a:p>
             <a:pPr lvl="0"/>
             <a:r>
-              <a:rPr lang="en-US" smtClean="0"/>
+              <a:rPr lang="en-US"/>
               <a:t>Click to edit Master text styles</a:t>
             </a:r>
           </a:p>
           <a:p>
             <a:pPr lvl="1"/>
             <a:r>
-              <a:rPr lang="en-US" smtClean="0"/>
+              <a:rPr lang="en-US"/>
               <a:t>Second level</a:t>
             </a:r>
           </a:p>
           <a:p>
             <a:pPr lvl="2"/>
             <a:r>
-              <a:rPr lang="en-US" smtClean="0"/>
+              <a:rPr lang="en-US"/>
               <a:t>Third level</a:t>
             </a:r>
           </a:p>
           <a:p>
             <a:pPr lvl="3"/>
             <a:r>
-              <a:rPr lang="en-US" smtClean="0"/>
+              <a:rPr lang="en-US"/>
               <a:t>Fourth level</a:t>
             </a:r>
           </a:p>
           <a:p>
             <a:pPr lvl="4"/>
             <a:r>
-              <a:rPr lang="en-US" smtClean="0"/>
+              <a:rPr lang="en-US"/>
               <a:t>Fifth level</a:t>
             </a:r>
             <a:endParaRPr lang="en-SG"/>
@@ -2736,7 +2738,7 @@
           <a:p>
             <a:fld id="{A1F532DB-2311-4BA7-A4CB-CC15A84E776B}" type="datetimeFigureOut">
               <a:rPr lang="en-SG" smtClean="0"/>
-              <a:t>27/8/2017</a:t>
+              <a:t>27/7/2021</a:t>
             </a:fld>
             <a:endParaRPr lang="en-SG"/>
           </a:p>
@@ -3113,7 +3115,13 @@
       </p:grpSpPr>
       <p:pic>
         <p:nvPicPr>
-          <p:cNvPr id="2" name="Picture 1"/>
+          <p:cNvPr id="6" name="Picture 5">
+            <a:extLst>
+              <a:ext uri="{FF2B5EF4-FFF2-40B4-BE49-F238E27FC236}">
+                <a16:creationId xmlns:a16="http://schemas.microsoft.com/office/drawing/2014/main" id="{1616E88C-31E0-4F12-BFE2-176CF7441600}"/>
+              </a:ext>
+            </a:extLst>
+          </p:cNvPr>
           <p:cNvPicPr>
             <a:picLocks noChangeAspect="1"/>
           </p:cNvPicPr>
@@ -3128,18 +3136,25 @@
         <p:spPr>
           <a:xfrm>
             <a:off x="561233" y="1786309"/>
-            <a:ext cx="8021532" cy="3285380"/>
+            <a:ext cx="8187231" cy="3178954"/>
           </a:xfrm>
           <a:prstGeom prst="rect">
             <a:avLst/>
           </a:prstGeom>
+          <a:solidFill>
+            <a:srgbClr val="FFFFFF">
+              <a:alpha val="0"/>
+            </a:srgbClr>
+          </a:solidFill>
+          <a:ln/>
           <a:effectLst>
             <a:outerShdw blurRad="63500" sx="102000" sy="102000" algn="ctr" rotWithShape="0">
-              <a:prstClr val="black">
+              <a:srgbClr val="000000">
                 <a:alpha val="40000"/>
-              </a:prstClr>
+              </a:srgbClr>
             </a:outerShdw>
           </a:effectLst>
+          <a:sp3d/>
         </p:spPr>
       </p:pic>
       <p:sp>
@@ -3150,7 +3165,7 @@
         </p:nvSpPr>
         <p:spPr>
           <a:xfrm rot="2570740">
-            <a:off x="2887852" y="3051005"/>
+            <a:off x="2743836" y="3267028"/>
             <a:ext cx="596492" cy="575353"/>
           </a:xfrm>
           <a:prstGeom prst="leftArrow">
@@ -3192,10 +3207,9 @@
           <a:p>
             <a:pPr algn="ctr"/>
             <a:r>
-              <a:rPr lang="en-US" sz="1400" b="1" dirty="0" smtClean="0"/>
+              <a:rPr lang="en-US" sz="1400" b="1" dirty="0"/>
               <a:t>1</a:t>
             </a:r>
-            <a:endParaRPr lang="en-US" sz="1400" b="1" dirty="0"/>
           </a:p>
         </p:txBody>
       </p:sp>
@@ -3207,7 +3221,7 @@
         </p:nvSpPr>
         <p:spPr>
           <a:xfrm rot="19650737">
-            <a:off x="7560163" y="3844469"/>
+            <a:off x="7632171" y="4192246"/>
             <a:ext cx="596492" cy="575353"/>
           </a:xfrm>
           <a:prstGeom prst="leftArrow">
@@ -3249,10 +3263,9 @@
           <a:p>
             <a:pPr algn="ctr"/>
             <a:r>
-              <a:rPr lang="en-US" sz="1400" b="1" dirty="0" smtClean="0"/>
+              <a:rPr lang="en-US" sz="1400" b="1" dirty="0"/>
               <a:t>2</a:t>
             </a:r>
-            <a:endParaRPr lang="en-US" sz="1400" b="1" dirty="0"/>
           </a:p>
         </p:txBody>
       </p:sp>
@@ -3260,6 +3273,531 @@
     <p:extLst>
       <p:ext uri="{BB962C8B-B14F-4D97-AF65-F5344CB8AC3E}">
         <p14:creationId xmlns:p14="http://schemas.microsoft.com/office/powerpoint/2010/main" val="819361605"/>
+      </p:ext>
+    </p:extLst>
+  </p:cSld>
+  <p:clrMapOvr>
+    <a:masterClrMapping/>
+  </p:clrMapOvr>
+</p:sld>
+</file>
+
+<file path=ppt/slides/slide2.xml><?xml version="1.0" encoding="utf-8"?>
+<p:sld xmlns:a="http://schemas.openxmlformats.org/drawingml/2006/main" xmlns:r="http://schemas.openxmlformats.org/officeDocument/2006/relationships" xmlns:p="http://schemas.openxmlformats.org/presentationml/2006/main">
+  <p:cSld>
+    <p:spTree>
+      <p:nvGrpSpPr>
+        <p:cNvPr id="1" name=""/>
+        <p:cNvGrpSpPr/>
+        <p:nvPr/>
+      </p:nvGrpSpPr>
+      <p:grpSpPr>
+        <a:xfrm>
+          <a:off x="0" y="0"/>
+          <a:ext cx="0" cy="0"/>
+          <a:chOff x="0" y="0"/>
+          <a:chExt cx="0" cy="0"/>
+        </a:xfrm>
+      </p:grpSpPr>
+      <p:pic>
+        <p:nvPicPr>
+          <p:cNvPr id="7" name="Picture 6">
+            <a:extLst>
+              <a:ext uri="{FF2B5EF4-FFF2-40B4-BE49-F238E27FC236}">
+                <a16:creationId xmlns:a16="http://schemas.microsoft.com/office/drawing/2014/main" id="{6F219759-1994-403E-B027-45BC98B1A440}"/>
+              </a:ext>
+            </a:extLst>
+          </p:cNvPr>
+          <p:cNvPicPr>
+            <a:picLocks noChangeAspect="1"/>
+          </p:cNvPicPr>
+          <p:nvPr/>
+        </p:nvPicPr>
+        <p:blipFill>
+          <a:blip r:embed="rId2"/>
+          <a:stretch>
+            <a:fillRect/>
+          </a:stretch>
+        </p:blipFill>
+        <p:spPr>
+          <a:xfrm>
+            <a:off x="561233" y="1786310"/>
+            <a:ext cx="8306073" cy="2290762"/>
+          </a:xfrm>
+          <a:prstGeom prst="rect">
+            <a:avLst/>
+          </a:prstGeom>
+          <a:solidFill>
+            <a:srgbClr val="FFFFFF">
+              <a:alpha val="0"/>
+            </a:srgbClr>
+          </a:solidFill>
+          <a:ln/>
+          <a:effectLst>
+            <a:outerShdw blurRad="63500" sx="102000" sy="102000" algn="ctr" rotWithShape="0">
+              <a:srgbClr val="000000">
+                <a:alpha val="40000"/>
+              </a:srgbClr>
+            </a:outerShdw>
+          </a:effectLst>
+          <a:sp3d/>
+        </p:spPr>
+      </p:pic>
+      <p:sp>
+        <p:nvSpPr>
+          <p:cNvPr id="3" name="Left Arrow 49"/>
+          <p:cNvSpPr/>
+          <p:nvPr/>
+        </p:nvSpPr>
+        <p:spPr>
+          <a:xfrm rot="2570740">
+            <a:off x="2147845" y="2443135"/>
+            <a:ext cx="596492" cy="575353"/>
+          </a:xfrm>
+          <a:prstGeom prst="leftArrow">
+            <a:avLst/>
+          </a:prstGeom>
+          <a:solidFill>
+            <a:srgbClr val="C00000"/>
+          </a:solidFill>
+          <a:ln>
+            <a:noFill/>
+          </a:ln>
+          <a:effectLst>
+            <a:outerShdw blurRad="50800" dist="38100" dir="2700000" algn="tl" rotWithShape="0">
+              <a:prstClr val="black">
+                <a:alpha val="40000"/>
+              </a:prstClr>
+            </a:outerShdw>
+          </a:effectLst>
+        </p:spPr>
+        <p:style>
+          <a:lnRef idx="2">
+            <a:schemeClr val="accent1">
+              <a:shade val="50000"/>
+            </a:schemeClr>
+          </a:lnRef>
+          <a:fillRef idx="1">
+            <a:schemeClr val="accent1"/>
+          </a:fillRef>
+          <a:effectRef idx="0">
+            <a:schemeClr val="accent1"/>
+          </a:effectRef>
+          <a:fontRef idx="minor">
+            <a:schemeClr val="lt1"/>
+          </a:fontRef>
+        </p:style>
+        <p:txBody>
+          <a:bodyPr rtlCol="0" anchor="ctr"/>
+          <a:lstStyle/>
+          <a:p>
+            <a:pPr algn="ctr"/>
+            <a:endParaRPr lang="en-US" sz="1400" b="1" dirty="0"/>
+          </a:p>
+        </p:txBody>
+      </p:sp>
+      <p:sp>
+        <p:nvSpPr>
+          <p:cNvPr id="2" name="Right Brace 1">
+            <a:extLst>
+              <a:ext uri="{FF2B5EF4-FFF2-40B4-BE49-F238E27FC236}">
+                <a16:creationId xmlns:a16="http://schemas.microsoft.com/office/drawing/2014/main" id="{C4599C98-8E8F-424B-BA00-662BC7E39F24}"/>
+              </a:ext>
+            </a:extLst>
+          </p:cNvPr>
+          <p:cNvSpPr/>
+          <p:nvPr/>
+        </p:nvSpPr>
+        <p:spPr>
+          <a:xfrm>
+            <a:off x="2031794" y="1844824"/>
+            <a:ext cx="144016" cy="827473"/>
+          </a:xfrm>
+          <a:prstGeom prst="rightBrace">
+            <a:avLst/>
+          </a:prstGeom>
+          <a:ln w="38100">
+            <a:solidFill>
+              <a:srgbClr val="C00000"/>
+            </a:solidFill>
+          </a:ln>
+          <a:effectLst>
+            <a:outerShdw blurRad="50800" dist="38100" dir="5400000" algn="t" rotWithShape="0">
+              <a:prstClr val="black">
+                <a:alpha val="40000"/>
+              </a:prstClr>
+            </a:outerShdw>
+          </a:effectLst>
+        </p:spPr>
+        <p:style>
+          <a:lnRef idx="1">
+            <a:schemeClr val="accent1"/>
+          </a:lnRef>
+          <a:fillRef idx="0">
+            <a:schemeClr val="accent1"/>
+          </a:fillRef>
+          <a:effectRef idx="0">
+            <a:schemeClr val="accent1"/>
+          </a:effectRef>
+          <a:fontRef idx="minor">
+            <a:schemeClr val="tx1"/>
+          </a:fontRef>
+        </p:style>
+        <p:txBody>
+          <a:bodyPr rtlCol="0" anchor="ctr"/>
+          <a:lstStyle/>
+          <a:p>
+            <a:pPr algn="ctr"/>
+            <a:endParaRPr lang="en-SG"/>
+          </a:p>
+        </p:txBody>
+      </p:sp>
+    </p:spTree>
+    <p:extLst>
+      <p:ext uri="{BB962C8B-B14F-4D97-AF65-F5344CB8AC3E}">
+        <p14:creationId xmlns:p14="http://schemas.microsoft.com/office/powerpoint/2010/main" val="3933956496"/>
+      </p:ext>
+    </p:extLst>
+  </p:cSld>
+  <p:clrMapOvr>
+    <a:masterClrMapping/>
+  </p:clrMapOvr>
+</p:sld>
+</file>
+
+<file path=ppt/slides/slide3.xml><?xml version="1.0" encoding="utf-8"?>
+<p:sld xmlns:a="http://schemas.openxmlformats.org/drawingml/2006/main" xmlns:r="http://schemas.openxmlformats.org/officeDocument/2006/relationships" xmlns:p="http://schemas.openxmlformats.org/presentationml/2006/main">
+  <p:cSld>
+    <p:spTree>
+      <p:nvGrpSpPr>
+        <p:cNvPr id="1" name=""/>
+        <p:cNvGrpSpPr/>
+        <p:nvPr/>
+      </p:nvGrpSpPr>
+      <p:grpSpPr>
+        <a:xfrm>
+          <a:off x="0" y="0"/>
+          <a:ext cx="0" cy="0"/>
+          <a:chOff x="0" y="0"/>
+          <a:chExt cx="0" cy="0"/>
+        </a:xfrm>
+      </p:grpSpPr>
+      <p:pic>
+        <p:nvPicPr>
+          <p:cNvPr id="6" name="Picture 5">
+            <a:extLst>
+              <a:ext uri="{FF2B5EF4-FFF2-40B4-BE49-F238E27FC236}">
+                <a16:creationId xmlns:a16="http://schemas.microsoft.com/office/drawing/2014/main" id="{4805295E-B0DD-4159-AD85-4F8713227F74}"/>
+              </a:ext>
+            </a:extLst>
+          </p:cNvPr>
+          <p:cNvPicPr>
+            <a:picLocks noChangeAspect="1"/>
+          </p:cNvPicPr>
+          <p:nvPr/>
+        </p:nvPicPr>
+        <p:blipFill>
+          <a:blip r:embed="rId2"/>
+          <a:stretch>
+            <a:fillRect/>
+          </a:stretch>
+        </p:blipFill>
+        <p:spPr>
+          <a:xfrm>
+            <a:off x="467544" y="428974"/>
+            <a:ext cx="8043215" cy="2993012"/>
+          </a:xfrm>
+          <a:prstGeom prst="rect">
+            <a:avLst/>
+          </a:prstGeom>
+          <a:solidFill>
+            <a:srgbClr val="FFFFFF">
+              <a:alpha val="0"/>
+            </a:srgbClr>
+          </a:solidFill>
+          <a:ln/>
+          <a:effectLst>
+            <a:outerShdw blurRad="63500" sx="102000" sy="102000" algn="ctr" rotWithShape="0">
+              <a:srgbClr val="000000">
+                <a:alpha val="40000"/>
+              </a:srgbClr>
+            </a:outerShdw>
+          </a:effectLst>
+          <a:sp3d/>
+        </p:spPr>
+      </p:pic>
+      <p:sp>
+        <p:nvSpPr>
+          <p:cNvPr id="3" name="Left Arrow 49"/>
+          <p:cNvSpPr/>
+          <p:nvPr/>
+        </p:nvSpPr>
+        <p:spPr>
+          <a:xfrm rot="2570740">
+            <a:off x="3586251" y="1224068"/>
+            <a:ext cx="596492" cy="575353"/>
+          </a:xfrm>
+          <a:prstGeom prst="leftArrow">
+            <a:avLst/>
+          </a:prstGeom>
+          <a:solidFill>
+            <a:srgbClr val="C00000"/>
+          </a:solidFill>
+          <a:ln>
+            <a:noFill/>
+          </a:ln>
+          <a:effectLst>
+            <a:outerShdw blurRad="50800" dist="38100" dir="2700000" algn="tl" rotWithShape="0">
+              <a:prstClr val="black">
+                <a:alpha val="40000"/>
+              </a:prstClr>
+            </a:outerShdw>
+          </a:effectLst>
+        </p:spPr>
+        <p:style>
+          <a:lnRef idx="2">
+            <a:schemeClr val="accent1">
+              <a:shade val="50000"/>
+            </a:schemeClr>
+          </a:lnRef>
+          <a:fillRef idx="1">
+            <a:schemeClr val="accent1"/>
+          </a:fillRef>
+          <a:effectRef idx="0">
+            <a:schemeClr val="accent1"/>
+          </a:effectRef>
+          <a:fontRef idx="minor">
+            <a:schemeClr val="lt1"/>
+          </a:fontRef>
+        </p:style>
+        <p:txBody>
+          <a:bodyPr rtlCol="0" anchor="ctr"/>
+          <a:lstStyle/>
+          <a:p>
+            <a:pPr algn="ctr"/>
+            <a:endParaRPr lang="en-US" sz="1400" b="1" dirty="0"/>
+          </a:p>
+        </p:txBody>
+      </p:sp>
+      <p:sp>
+        <p:nvSpPr>
+          <p:cNvPr id="2" name="Right Brace 1">
+            <a:extLst>
+              <a:ext uri="{FF2B5EF4-FFF2-40B4-BE49-F238E27FC236}">
+                <a16:creationId xmlns:a16="http://schemas.microsoft.com/office/drawing/2014/main" id="{C4599C98-8E8F-424B-BA00-662BC7E39F24}"/>
+              </a:ext>
+            </a:extLst>
+          </p:cNvPr>
+          <p:cNvSpPr/>
+          <p:nvPr/>
+        </p:nvSpPr>
+        <p:spPr>
+          <a:xfrm>
+            <a:off x="1896863" y="1657927"/>
+            <a:ext cx="205183" cy="557753"/>
+          </a:xfrm>
+          <a:prstGeom prst="rightBrace">
+            <a:avLst/>
+          </a:prstGeom>
+          <a:ln w="38100">
+            <a:solidFill>
+              <a:srgbClr val="C00000"/>
+            </a:solidFill>
+          </a:ln>
+          <a:effectLst>
+            <a:outerShdw blurRad="50800" dist="38100" dir="5400000" algn="t" rotWithShape="0">
+              <a:prstClr val="black">
+                <a:alpha val="40000"/>
+              </a:prstClr>
+            </a:outerShdw>
+          </a:effectLst>
+        </p:spPr>
+        <p:style>
+          <a:lnRef idx="1">
+            <a:schemeClr val="accent1"/>
+          </a:lnRef>
+          <a:fillRef idx="0">
+            <a:schemeClr val="accent1"/>
+          </a:fillRef>
+          <a:effectRef idx="0">
+            <a:schemeClr val="accent1"/>
+          </a:effectRef>
+          <a:fontRef idx="minor">
+            <a:schemeClr val="tx1"/>
+          </a:fontRef>
+        </p:style>
+        <p:txBody>
+          <a:bodyPr rtlCol="0" anchor="ctr"/>
+          <a:lstStyle/>
+          <a:p>
+            <a:pPr algn="ctr"/>
+            <a:endParaRPr lang="en-SG"/>
+          </a:p>
+        </p:txBody>
+      </p:sp>
+      <p:pic>
+        <p:nvPicPr>
+          <p:cNvPr id="4" name="Picture 3">
+            <a:extLst>
+              <a:ext uri="{FF2B5EF4-FFF2-40B4-BE49-F238E27FC236}">
+                <a16:creationId xmlns:a16="http://schemas.microsoft.com/office/drawing/2014/main" id="{9B4E7C3E-1596-49CA-A2F7-1C4F23A1C353}"/>
+              </a:ext>
+            </a:extLst>
+          </p:cNvPr>
+          <p:cNvPicPr>
+            <a:picLocks noChangeAspect="1"/>
+          </p:cNvPicPr>
+          <p:nvPr/>
+        </p:nvPicPr>
+        <p:blipFill>
+          <a:blip r:embed="rId3"/>
+          <a:stretch>
+            <a:fillRect/>
+          </a:stretch>
+        </p:blipFill>
+        <p:spPr>
+          <a:xfrm>
+            <a:off x="467544" y="3573016"/>
+            <a:ext cx="8035946" cy="2846233"/>
+          </a:xfrm>
+          <a:prstGeom prst="rect">
+            <a:avLst/>
+          </a:prstGeom>
+          <a:solidFill>
+            <a:srgbClr val="FFFFFF">
+              <a:alpha val="0"/>
+            </a:srgbClr>
+          </a:solidFill>
+          <a:ln/>
+          <a:effectLst>
+            <a:outerShdw blurRad="63500" sx="102000" sy="102000" algn="ctr" rotWithShape="0">
+              <a:srgbClr val="000000">
+                <a:alpha val="40000"/>
+              </a:srgbClr>
+            </a:outerShdw>
+          </a:effectLst>
+          <a:sp3d/>
+        </p:spPr>
+      </p:pic>
+      <p:sp>
+        <p:nvSpPr>
+          <p:cNvPr id="9" name="Left Arrow 49">
+            <a:extLst>
+              <a:ext uri="{FF2B5EF4-FFF2-40B4-BE49-F238E27FC236}">
+                <a16:creationId xmlns:a16="http://schemas.microsoft.com/office/drawing/2014/main" id="{EB62889E-27C1-4F71-9179-014D89030B7A}"/>
+              </a:ext>
+            </a:extLst>
+          </p:cNvPr>
+          <p:cNvSpPr/>
+          <p:nvPr/>
+        </p:nvSpPr>
+        <p:spPr>
+          <a:xfrm rot="19854570">
+            <a:off x="2023370" y="3966871"/>
+            <a:ext cx="596492" cy="575353"/>
+          </a:xfrm>
+          <a:prstGeom prst="leftArrow">
+            <a:avLst/>
+          </a:prstGeom>
+          <a:solidFill>
+            <a:srgbClr val="C00000"/>
+          </a:solidFill>
+          <a:ln>
+            <a:noFill/>
+          </a:ln>
+          <a:effectLst>
+            <a:outerShdw blurRad="50800" dist="38100" dir="2700000" algn="tl" rotWithShape="0">
+              <a:prstClr val="black">
+                <a:alpha val="40000"/>
+              </a:prstClr>
+            </a:outerShdw>
+          </a:effectLst>
+        </p:spPr>
+        <p:style>
+          <a:lnRef idx="2">
+            <a:schemeClr val="accent1">
+              <a:shade val="50000"/>
+            </a:schemeClr>
+          </a:lnRef>
+          <a:fillRef idx="1">
+            <a:schemeClr val="accent1"/>
+          </a:fillRef>
+          <a:effectRef idx="0">
+            <a:schemeClr val="accent1"/>
+          </a:effectRef>
+          <a:fontRef idx="minor">
+            <a:schemeClr val="lt1"/>
+          </a:fontRef>
+        </p:style>
+        <p:txBody>
+          <a:bodyPr rtlCol="0" anchor="ctr"/>
+          <a:lstStyle/>
+          <a:p>
+            <a:pPr algn="ctr"/>
+            <a:endParaRPr lang="en-US" sz="1400" b="1" dirty="0"/>
+          </a:p>
+        </p:txBody>
+      </p:sp>
+      <p:sp>
+        <p:nvSpPr>
+          <p:cNvPr id="10" name="Right Brace 9">
+            <a:extLst>
+              <a:ext uri="{FF2B5EF4-FFF2-40B4-BE49-F238E27FC236}">
+                <a16:creationId xmlns:a16="http://schemas.microsoft.com/office/drawing/2014/main" id="{C3578EBF-1E8E-40A0-83BB-C1D45341CB61}"/>
+              </a:ext>
+            </a:extLst>
+          </p:cNvPr>
+          <p:cNvSpPr/>
+          <p:nvPr/>
+        </p:nvSpPr>
+        <p:spPr>
+          <a:xfrm>
+            <a:off x="2854647" y="5141046"/>
+            <a:ext cx="205183" cy="557753"/>
+          </a:xfrm>
+          <a:prstGeom prst="rightBrace">
+            <a:avLst/>
+          </a:prstGeom>
+          <a:ln w="38100">
+            <a:solidFill>
+              <a:srgbClr val="C00000"/>
+            </a:solidFill>
+          </a:ln>
+          <a:effectLst>
+            <a:outerShdw blurRad="50800" dist="38100" dir="5400000" algn="t" rotWithShape="0">
+              <a:prstClr val="black">
+                <a:alpha val="40000"/>
+              </a:prstClr>
+            </a:outerShdw>
+          </a:effectLst>
+        </p:spPr>
+        <p:style>
+          <a:lnRef idx="1">
+            <a:schemeClr val="accent1"/>
+          </a:lnRef>
+          <a:fillRef idx="0">
+            <a:schemeClr val="accent1"/>
+          </a:fillRef>
+          <a:effectRef idx="0">
+            <a:schemeClr val="accent1"/>
+          </a:effectRef>
+          <a:fontRef idx="minor">
+            <a:schemeClr val="tx1"/>
+          </a:fontRef>
+        </p:style>
+        <p:txBody>
+          <a:bodyPr rtlCol="0" anchor="ctr"/>
+          <a:lstStyle/>
+          <a:p>
+            <a:pPr algn="ctr"/>
+            <a:endParaRPr lang="en-SG"/>
+          </a:p>
+        </p:txBody>
+      </p:sp>
+    </p:spTree>
+    <p:extLst>
+      <p:ext uri="{BB962C8B-B14F-4D97-AF65-F5344CB8AC3E}">
+        <p14:creationId xmlns:p14="http://schemas.microsoft.com/office/powerpoint/2010/main" val="2262738583"/>
       </p:ext>
     </p:extLst>
   </p:cSld>

</xml_diff>